<commit_message>
Updates para segunda clase
</commit_message>
<xml_diff>
--- a/1) Entrada & Salida C#/Entrada y Salida con C# y Java Netbeans.pptx
+++ b/1) Entrada & Salida C#/Entrada y Salida con C# y Java Netbeans.pptx
@@ -129,6 +129,22 @@
       </a:defRPr>
     </a:lvl9pPr>
   </p:defaultTextStyle>
+  <p:extLst>
+    <p:ext uri="{EFAFB233-063F-42B5-8137-9DF3F51BA10A}">
+      <p15:sldGuideLst xmlns:p15="http://schemas.microsoft.com/office/powerpoint/2012/main">
+        <p15:guide id="1" orient="horz" pos="2160">
+          <p15:clr>
+            <a:srgbClr val="A4A3A4"/>
+          </p15:clr>
+        </p15:guide>
+        <p15:guide id="2" pos="2880">
+          <p15:clr>
+            <a:srgbClr val="A4A3A4"/>
+          </p15:clr>
+        </p15:guide>
+      </p15:sldGuideLst>
+    </p:ext>
+  </p:extLst>
 </p:presentation>
 </file>
 
@@ -471,7 +487,7 @@
           </a:lstStyle>
           <a:p>
             <a:r>
-              <a:rPr lang="es-ES" smtClean="0"/>
+              <a:rPr lang="es-ES"/>
               <a:t>Haga clic para modificar el estilo de título del patrón</a:t>
             </a:r>
             <a:endParaRPr lang="en-US" dirty="0"/>
@@ -590,7 +606,7 @@
           </a:lstStyle>
           <a:p>
             <a:r>
-              <a:rPr lang="es-ES" smtClean="0"/>
+              <a:rPr lang="es-ES"/>
               <a:t>Haga clic para modificar el estilo de subtítulo del patrón</a:t>
             </a:r>
             <a:endParaRPr lang="en-US" dirty="0"/>
@@ -627,7 +643,7 @@
           <a:p>
             <a:fld id="{369A22FC-D8AB-413D-B74C-5A3B7CEA8F30}" type="datetimeFigureOut">
               <a:rPr lang="es-CR" smtClean="0"/>
-              <a:t>14/10/2014</a:t>
+              <a:t>3/6/2024</a:t>
             </a:fld>
             <a:endParaRPr lang="es-CR"/>
           </a:p>
@@ -777,7 +793,7 @@
           <a:lstStyle/>
           <a:p>
             <a:r>
-              <a:rPr lang="es-ES" smtClean="0"/>
+              <a:rPr lang="es-ES"/>
               <a:t>Haga clic para modificar el estilo de título del patrón</a:t>
             </a:r>
             <a:endParaRPr lang="en-US"/>
@@ -801,35 +817,35 @@
           <a:p>
             <a:pPr lvl="0"/>
             <a:r>
-              <a:rPr lang="es-ES" smtClean="0"/>
+              <a:rPr lang="es-ES"/>
               <a:t>Haga clic para modificar el estilo de texto del patrón</a:t>
             </a:r>
           </a:p>
           <a:p>
             <a:pPr lvl="1"/>
             <a:r>
-              <a:rPr lang="es-ES" smtClean="0"/>
+              <a:rPr lang="es-ES"/>
               <a:t>Segundo nivel</a:t>
             </a:r>
           </a:p>
           <a:p>
             <a:pPr lvl="2"/>
             <a:r>
-              <a:rPr lang="es-ES" smtClean="0"/>
+              <a:rPr lang="es-ES"/>
               <a:t>Tercer nivel</a:t>
             </a:r>
           </a:p>
           <a:p>
             <a:pPr lvl="3"/>
             <a:r>
-              <a:rPr lang="es-ES" smtClean="0"/>
+              <a:rPr lang="es-ES"/>
               <a:t>Cuarto nivel</a:t>
             </a:r>
           </a:p>
           <a:p>
             <a:pPr lvl="4"/>
             <a:r>
-              <a:rPr lang="es-ES" smtClean="0"/>
+              <a:rPr lang="es-ES"/>
               <a:t>Quinto nivel</a:t>
             </a:r>
             <a:endParaRPr lang="en-US"/>
@@ -853,7 +869,7 @@
           <a:p>
             <a:fld id="{369A22FC-D8AB-413D-B74C-5A3B7CEA8F30}" type="datetimeFigureOut">
               <a:rPr lang="es-CR" smtClean="0"/>
-              <a:t>14/10/2014</a:t>
+              <a:t>3/6/2024</a:t>
             </a:fld>
             <a:endParaRPr lang="es-CR"/>
           </a:p>
@@ -947,7 +963,7 @@
           <a:lstStyle/>
           <a:p>
             <a:r>
-              <a:rPr lang="es-ES" smtClean="0"/>
+              <a:rPr lang="es-ES"/>
               <a:t>Haga clic para modificar el estilo de título del patrón</a:t>
             </a:r>
             <a:endParaRPr lang="en-US"/>
@@ -976,35 +992,35 @@
           <a:p>
             <a:pPr lvl="0"/>
             <a:r>
-              <a:rPr lang="es-ES" smtClean="0"/>
+              <a:rPr lang="es-ES"/>
               <a:t>Haga clic para modificar el estilo de texto del patrón</a:t>
             </a:r>
           </a:p>
           <a:p>
             <a:pPr lvl="1"/>
             <a:r>
-              <a:rPr lang="es-ES" smtClean="0"/>
+              <a:rPr lang="es-ES"/>
               <a:t>Segundo nivel</a:t>
             </a:r>
           </a:p>
           <a:p>
             <a:pPr lvl="2"/>
             <a:r>
-              <a:rPr lang="es-ES" smtClean="0"/>
+              <a:rPr lang="es-ES"/>
               <a:t>Tercer nivel</a:t>
             </a:r>
           </a:p>
           <a:p>
             <a:pPr lvl="3"/>
             <a:r>
-              <a:rPr lang="es-ES" smtClean="0"/>
+              <a:rPr lang="es-ES"/>
               <a:t>Cuarto nivel</a:t>
             </a:r>
           </a:p>
           <a:p>
             <a:pPr lvl="4"/>
             <a:r>
-              <a:rPr lang="es-ES" smtClean="0"/>
+              <a:rPr lang="es-ES"/>
               <a:t>Quinto nivel</a:t>
             </a:r>
             <a:endParaRPr lang="en-US"/>
@@ -1028,7 +1044,7 @@
           <a:p>
             <a:fld id="{369A22FC-D8AB-413D-B74C-5A3B7CEA8F30}" type="datetimeFigureOut">
               <a:rPr lang="es-CR" smtClean="0"/>
-              <a:t>14/10/2014</a:t>
+              <a:t>3/6/2024</a:t>
             </a:fld>
             <a:endParaRPr lang="es-CR"/>
           </a:p>
@@ -1117,7 +1133,7 @@
           <a:lstStyle/>
           <a:p>
             <a:r>
-              <a:rPr lang="es-ES" smtClean="0"/>
+              <a:rPr lang="es-ES"/>
               <a:t>Haga clic para modificar el estilo de título del patrón</a:t>
             </a:r>
             <a:endParaRPr lang="en-US" dirty="0"/>
@@ -1141,35 +1157,35 @@
           <a:p>
             <a:pPr lvl="0"/>
             <a:r>
-              <a:rPr lang="es-ES" smtClean="0"/>
+              <a:rPr lang="es-ES"/>
               <a:t>Haga clic para modificar el estilo de texto del patrón</a:t>
             </a:r>
           </a:p>
           <a:p>
             <a:pPr lvl="1"/>
             <a:r>
-              <a:rPr lang="es-ES" smtClean="0"/>
+              <a:rPr lang="es-ES"/>
               <a:t>Segundo nivel</a:t>
             </a:r>
           </a:p>
           <a:p>
             <a:pPr lvl="2"/>
             <a:r>
-              <a:rPr lang="es-ES" smtClean="0"/>
+              <a:rPr lang="es-ES"/>
               <a:t>Tercer nivel</a:t>
             </a:r>
           </a:p>
           <a:p>
             <a:pPr lvl="3"/>
             <a:r>
-              <a:rPr lang="es-ES" smtClean="0"/>
+              <a:rPr lang="es-ES"/>
               <a:t>Cuarto nivel</a:t>
             </a:r>
           </a:p>
           <a:p>
             <a:pPr lvl="4"/>
             <a:r>
-              <a:rPr lang="es-ES" smtClean="0"/>
+              <a:rPr lang="es-ES"/>
               <a:t>Quinto nivel</a:t>
             </a:r>
             <a:endParaRPr lang="en-US"/>
@@ -1193,7 +1209,7 @@
           <a:p>
             <a:fld id="{369A22FC-D8AB-413D-B74C-5A3B7CEA8F30}" type="datetimeFigureOut">
               <a:rPr lang="es-CR" smtClean="0"/>
-              <a:t>14/10/2014</a:t>
+              <a:t>3/6/2024</a:t>
             </a:fld>
             <a:endParaRPr lang="es-CR"/>
           </a:p>
@@ -1291,7 +1307,7 @@
           </a:lstStyle>
           <a:p>
             <a:r>
-              <a:rPr lang="es-ES" smtClean="0"/>
+              <a:rPr lang="es-ES"/>
               <a:t>Haga clic para modificar el estilo de título del patrón</a:t>
             </a:r>
             <a:endParaRPr lang="en-US" dirty="0"/>
@@ -1411,7 +1427,7 @@
           <a:p>
             <a:pPr lvl="0"/>
             <a:r>
-              <a:rPr lang="es-ES" smtClean="0"/>
+              <a:rPr lang="es-ES"/>
               <a:t>Haga clic para modificar el estilo de texto del patrón</a:t>
             </a:r>
           </a:p>
@@ -1434,7 +1450,7 @@
           <a:p>
             <a:fld id="{369A22FC-D8AB-413D-B74C-5A3B7CEA8F30}" type="datetimeFigureOut">
               <a:rPr lang="es-CR" smtClean="0"/>
-              <a:t>14/10/2014</a:t>
+              <a:t>3/6/2024</a:t>
             </a:fld>
             <a:endParaRPr lang="es-CR"/>
           </a:p>
@@ -1523,7 +1539,7 @@
           <a:lstStyle/>
           <a:p>
             <a:r>
-              <a:rPr lang="es-ES" smtClean="0"/>
+              <a:rPr lang="es-ES"/>
               <a:t>Haga clic para modificar el estilo de título del patrón</a:t>
             </a:r>
             <a:endParaRPr lang="en-US"/>
@@ -1547,7 +1563,7 @@
           <a:p>
             <a:fld id="{369A22FC-D8AB-413D-B74C-5A3B7CEA8F30}" type="datetimeFigureOut">
               <a:rPr lang="es-CR" smtClean="0"/>
-              <a:t>14/10/2014</a:t>
+              <a:t>3/6/2024</a:t>
             </a:fld>
             <a:endParaRPr lang="es-CR"/>
           </a:p>
@@ -1617,35 +1633,35 @@
           <a:p>
             <a:pPr lvl="0"/>
             <a:r>
-              <a:rPr lang="es-ES" smtClean="0"/>
+              <a:rPr lang="es-ES"/>
               <a:t>Haga clic para modificar el estilo de texto del patrón</a:t>
             </a:r>
           </a:p>
           <a:p>
             <a:pPr lvl="1"/>
             <a:r>
-              <a:rPr lang="es-ES" smtClean="0"/>
+              <a:rPr lang="es-ES"/>
               <a:t>Segundo nivel</a:t>
             </a:r>
           </a:p>
           <a:p>
             <a:pPr lvl="2"/>
             <a:r>
-              <a:rPr lang="es-ES" smtClean="0"/>
+              <a:rPr lang="es-ES"/>
               <a:t>Tercer nivel</a:t>
             </a:r>
           </a:p>
           <a:p>
             <a:pPr lvl="3"/>
             <a:r>
-              <a:rPr lang="es-ES" smtClean="0"/>
+              <a:rPr lang="es-ES"/>
               <a:t>Cuarto nivel</a:t>
             </a:r>
           </a:p>
           <a:p>
             <a:pPr lvl="4"/>
             <a:r>
-              <a:rPr lang="es-ES" smtClean="0"/>
+              <a:rPr lang="es-ES"/>
               <a:t>Quinto nivel</a:t>
             </a:r>
             <a:endParaRPr lang="en-US" dirty="0"/>
@@ -1674,35 +1690,35 @@
           <a:p>
             <a:pPr lvl="0"/>
             <a:r>
-              <a:rPr lang="es-ES" smtClean="0"/>
+              <a:rPr lang="es-ES"/>
               <a:t>Haga clic para modificar el estilo de texto del patrón</a:t>
             </a:r>
           </a:p>
           <a:p>
             <a:pPr lvl="1"/>
             <a:r>
-              <a:rPr lang="es-ES" smtClean="0"/>
+              <a:rPr lang="es-ES"/>
               <a:t>Segundo nivel</a:t>
             </a:r>
           </a:p>
           <a:p>
             <a:pPr lvl="2"/>
             <a:r>
-              <a:rPr lang="es-ES" smtClean="0"/>
+              <a:rPr lang="es-ES"/>
               <a:t>Tercer nivel</a:t>
             </a:r>
           </a:p>
           <a:p>
             <a:pPr lvl="3"/>
             <a:r>
-              <a:rPr lang="es-ES" smtClean="0"/>
+              <a:rPr lang="es-ES"/>
               <a:t>Cuarto nivel</a:t>
             </a:r>
           </a:p>
           <a:p>
             <a:pPr lvl="4"/>
             <a:r>
-              <a:rPr lang="es-ES" smtClean="0"/>
+              <a:rPr lang="es-ES"/>
               <a:t>Quinto nivel</a:t>
             </a:r>
             <a:endParaRPr lang="en-US" dirty="0"/>
@@ -1754,7 +1770,7 @@
           </a:lstStyle>
           <a:p>
             <a:r>
-              <a:rPr lang="es-ES" smtClean="0"/>
+              <a:rPr lang="es-ES"/>
               <a:t>Haga clic para modificar el estilo de título del patrón</a:t>
             </a:r>
             <a:endParaRPr lang="en-US" dirty="0"/>
@@ -1828,7 +1844,7 @@
           <a:p>
             <a:pPr lvl="0"/>
             <a:r>
-              <a:rPr lang="es-ES" smtClean="0"/>
+              <a:rPr lang="es-ES"/>
               <a:t>Haga clic para modificar el estilo de texto del patrón</a:t>
             </a:r>
           </a:p>
@@ -1901,7 +1917,7 @@
           <a:p>
             <a:pPr lvl="0"/>
             <a:r>
-              <a:rPr lang="es-ES" smtClean="0"/>
+              <a:rPr lang="es-ES"/>
               <a:t>Haga clic para modificar el estilo de texto del patrón</a:t>
             </a:r>
           </a:p>
@@ -1924,7 +1940,7 @@
           <a:p>
             <a:fld id="{369A22FC-D8AB-413D-B74C-5A3B7CEA8F30}" type="datetimeFigureOut">
               <a:rPr lang="es-CR" smtClean="0"/>
-              <a:t>14/10/2014</a:t>
+              <a:t>3/6/2024</a:t>
             </a:fld>
             <a:endParaRPr lang="es-CR"/>
           </a:p>
@@ -7412,35 +7428,35 @@
           <a:p>
             <a:pPr lvl="0"/>
             <a:r>
-              <a:rPr lang="es-ES" smtClean="0"/>
+              <a:rPr lang="es-ES"/>
               <a:t>Haga clic para modificar el estilo de texto del patrón</a:t>
             </a:r>
           </a:p>
           <a:p>
             <a:pPr lvl="1"/>
             <a:r>
-              <a:rPr lang="es-ES" smtClean="0"/>
+              <a:rPr lang="es-ES"/>
               <a:t>Segundo nivel</a:t>
             </a:r>
           </a:p>
           <a:p>
             <a:pPr lvl="2"/>
             <a:r>
-              <a:rPr lang="es-ES" smtClean="0"/>
+              <a:rPr lang="es-ES"/>
               <a:t>Tercer nivel</a:t>
             </a:r>
           </a:p>
           <a:p>
             <a:pPr lvl="3"/>
             <a:r>
-              <a:rPr lang="es-ES" smtClean="0"/>
+              <a:rPr lang="es-ES"/>
               <a:t>Cuarto nivel</a:t>
             </a:r>
           </a:p>
           <a:p>
             <a:pPr lvl="4"/>
             <a:r>
-              <a:rPr lang="es-ES" smtClean="0"/>
+              <a:rPr lang="es-ES"/>
               <a:t>Quinto nivel</a:t>
             </a:r>
             <a:endParaRPr lang="en-US" dirty="0"/>
@@ -7469,35 +7485,35 @@
           <a:p>
             <a:pPr lvl="0"/>
             <a:r>
-              <a:rPr lang="es-ES" smtClean="0"/>
+              <a:rPr lang="es-ES"/>
               <a:t>Haga clic para modificar el estilo de texto del patrón</a:t>
             </a:r>
           </a:p>
           <a:p>
             <a:pPr lvl="1"/>
             <a:r>
-              <a:rPr lang="es-ES" smtClean="0"/>
+              <a:rPr lang="es-ES"/>
               <a:t>Segundo nivel</a:t>
             </a:r>
           </a:p>
           <a:p>
             <a:pPr lvl="2"/>
             <a:r>
-              <a:rPr lang="es-ES" smtClean="0"/>
+              <a:rPr lang="es-ES"/>
               <a:t>Tercer nivel</a:t>
             </a:r>
           </a:p>
           <a:p>
             <a:pPr lvl="3"/>
             <a:r>
-              <a:rPr lang="es-ES" smtClean="0"/>
+              <a:rPr lang="es-ES"/>
               <a:t>Cuarto nivel</a:t>
             </a:r>
           </a:p>
           <a:p>
             <a:pPr lvl="4"/>
             <a:r>
-              <a:rPr lang="es-ES" smtClean="0"/>
+              <a:rPr lang="es-ES"/>
               <a:t>Quinto nivel</a:t>
             </a:r>
             <a:endParaRPr lang="en-US" dirty="0"/>
@@ -7545,7 +7561,7 @@
           <a:lstStyle/>
           <a:p>
             <a:r>
-              <a:rPr lang="es-ES" smtClean="0"/>
+              <a:rPr lang="es-ES"/>
               <a:t>Haga clic para modificar el estilo de título del patrón</a:t>
             </a:r>
             <a:endParaRPr lang="en-US"/>
@@ -7569,7 +7585,7 @@
           <a:p>
             <a:fld id="{369A22FC-D8AB-413D-B74C-5A3B7CEA8F30}" type="datetimeFigureOut">
               <a:rPr lang="es-CR" smtClean="0"/>
-              <a:t>14/10/2014</a:t>
+              <a:t>3/6/2024</a:t>
             </a:fld>
             <a:endParaRPr lang="es-CR"/>
           </a:p>
@@ -7659,7 +7675,7 @@
           <a:p>
             <a:fld id="{369A22FC-D8AB-413D-B74C-5A3B7CEA8F30}" type="datetimeFigureOut">
               <a:rPr lang="es-CR" smtClean="0"/>
-              <a:t>14/10/2014</a:t>
+              <a:t>3/6/2024</a:t>
             </a:fld>
             <a:endParaRPr lang="es-CR"/>
           </a:p>
@@ -7757,7 +7773,7 @@
           </a:lstStyle>
           <a:p>
             <a:r>
-              <a:rPr lang="es-ES" smtClean="0"/>
+              <a:rPr lang="es-ES"/>
               <a:t>Haga clic para modificar el estilo de título del patrón</a:t>
             </a:r>
             <a:endParaRPr lang="en-US"/>
@@ -7814,35 +7830,35 @@
           <a:p>
             <a:pPr lvl="0"/>
             <a:r>
-              <a:rPr lang="es-ES" smtClean="0"/>
+              <a:rPr lang="es-ES"/>
               <a:t>Haga clic para modificar el estilo de texto del patrón</a:t>
             </a:r>
           </a:p>
           <a:p>
             <a:pPr lvl="1"/>
             <a:r>
-              <a:rPr lang="es-ES" smtClean="0"/>
+              <a:rPr lang="es-ES"/>
               <a:t>Segundo nivel</a:t>
             </a:r>
           </a:p>
           <a:p>
             <a:pPr lvl="2"/>
             <a:r>
-              <a:rPr lang="es-ES" smtClean="0"/>
+              <a:rPr lang="es-ES"/>
               <a:t>Tercer nivel</a:t>
             </a:r>
           </a:p>
           <a:p>
             <a:pPr lvl="3"/>
             <a:r>
-              <a:rPr lang="es-ES" smtClean="0"/>
+              <a:rPr lang="es-ES"/>
               <a:t>Cuarto nivel</a:t>
             </a:r>
           </a:p>
           <a:p>
             <a:pPr lvl="4"/>
             <a:r>
-              <a:rPr lang="es-ES" smtClean="0"/>
+              <a:rPr lang="es-ES"/>
               <a:t>Quinto nivel</a:t>
             </a:r>
             <a:endParaRPr lang="en-US" dirty="0"/>
@@ -7908,7 +7924,7 @@
           <a:p>
             <a:pPr lvl="0"/>
             <a:r>
-              <a:rPr lang="es-ES" smtClean="0"/>
+              <a:rPr lang="es-ES"/>
               <a:t>Haga clic para modificar el estilo de texto del patrón</a:t>
             </a:r>
           </a:p>
@@ -7931,7 +7947,7 @@
           <a:p>
             <a:fld id="{369A22FC-D8AB-413D-B74C-5A3B7CEA8F30}" type="datetimeFigureOut">
               <a:rPr lang="es-CR" smtClean="0"/>
-              <a:t>14/10/2014</a:t>
+              <a:t>3/6/2024</a:t>
             </a:fld>
             <a:endParaRPr lang="es-CR"/>
           </a:p>
@@ -8053,7 +8069,7 @@
           </a:lstStyle>
           <a:p>
             <a:r>
-              <a:rPr lang="es-ES" smtClean="0"/>
+              <a:rPr lang="es-ES"/>
               <a:t>Haga clic para modificar el estilo de título del patrón</a:t>
             </a:r>
             <a:endParaRPr lang="en-US" dirty="0"/>
@@ -8148,7 +8164,7 @@
           </a:lstStyle>
           <a:p>
             <a:r>
-              <a:rPr lang="es-ES" smtClean="0"/>
+              <a:rPr lang="es-ES"/>
               <a:t>Haga clic en el icono para agregar una imagen</a:t>
             </a:r>
             <a:endParaRPr lang="en-US"/>
@@ -8216,7 +8232,7 @@
           <a:p>
             <a:pPr lvl="0"/>
             <a:r>
-              <a:rPr lang="es-ES" smtClean="0"/>
+              <a:rPr lang="es-ES"/>
               <a:t>Haga clic para modificar el estilo de texto del patrón</a:t>
             </a:r>
           </a:p>
@@ -8239,7 +8255,7 @@
           <a:p>
             <a:fld id="{369A22FC-D8AB-413D-B74C-5A3B7CEA8F30}" type="datetimeFigureOut">
               <a:rPr lang="es-CR" smtClean="0"/>
-              <a:t>14/10/2014</a:t>
+              <a:t>3/6/2024</a:t>
             </a:fld>
             <a:endParaRPr lang="es-CR"/>
           </a:p>
@@ -8369,7 +8385,7 @@
           <a:lstStyle/>
           <a:p>
             <a:r>
-              <a:rPr lang="es-ES" smtClean="0"/>
+              <a:rPr lang="es-ES"/>
               <a:t>Haga clic para modificar el estilo de título del patrón</a:t>
             </a:r>
             <a:endParaRPr lang="en-US" dirty="0"/>
@@ -8403,35 +8419,35 @@
           <a:p>
             <a:pPr lvl="0"/>
             <a:r>
-              <a:rPr lang="es-ES" smtClean="0"/>
+              <a:rPr lang="es-ES"/>
               <a:t>Haga clic para modificar el estilo de texto del patrón</a:t>
             </a:r>
           </a:p>
           <a:p>
             <a:pPr lvl="1"/>
             <a:r>
-              <a:rPr lang="es-ES" smtClean="0"/>
+              <a:rPr lang="es-ES"/>
               <a:t>Segundo nivel</a:t>
             </a:r>
           </a:p>
           <a:p>
             <a:pPr lvl="2"/>
             <a:r>
-              <a:rPr lang="es-ES" smtClean="0"/>
+              <a:rPr lang="es-ES"/>
               <a:t>Tercer nivel</a:t>
             </a:r>
           </a:p>
           <a:p>
             <a:pPr lvl="3"/>
             <a:r>
-              <a:rPr lang="es-ES" smtClean="0"/>
+              <a:rPr lang="es-ES"/>
               <a:t>Cuarto nivel</a:t>
             </a:r>
           </a:p>
           <a:p>
             <a:pPr lvl="4"/>
             <a:r>
-              <a:rPr lang="es-ES" smtClean="0"/>
+              <a:rPr lang="es-ES"/>
               <a:t>Quinto nivel</a:t>
             </a:r>
             <a:endParaRPr lang="en-US" dirty="0"/>
@@ -8476,7 +8492,7 @@
           <a:p>
             <a:fld id="{369A22FC-D8AB-413D-B74C-5A3B7CEA8F30}" type="datetimeFigureOut">
               <a:rPr lang="es-CR" smtClean="0"/>
-              <a:t>14/10/2014</a:t>
+              <a:t>3/6/2024</a:t>
             </a:fld>
             <a:endParaRPr lang="es-CR"/>
           </a:p>
@@ -8995,10 +9011,9 @@
           <a:lstStyle/>
           <a:p>
             <a:r>
-              <a:rPr lang="es-CR" sz="4000" dirty="0" smtClean="0"/>
+              <a:rPr lang="es-CR" sz="4000" dirty="0"/>
               <a:t>Introducción a la Programación con Java y C#</a:t>
             </a:r>
-            <a:endParaRPr lang="es-CR" sz="4000" dirty="0"/>
           </a:p>
         </p:txBody>
       </p:sp>
@@ -9026,20 +9041,27 @@
           <a:p>
             <a:pPr algn="l"/>
             <a:r>
-              <a:rPr lang="es-CR" dirty="0" smtClean="0"/>
+              <a:rPr lang="es-CR" dirty="0"/>
               <a:t>Lección #1: Entrada y Salida</a:t>
             </a:r>
           </a:p>
           <a:p>
-            <a:endParaRPr lang="es-CR" dirty="0" smtClean="0"/>
+            <a:endParaRPr lang="es-CR" dirty="0"/>
           </a:p>
           <a:p>
             <a:pPr algn="l"/>
             <a:r>
-              <a:rPr lang="es-CR" dirty="0" smtClean="0"/>
-              <a:t>Lic. Santiago Rodríguez Paniagua. (2014)</a:t>
-            </a:r>
-            <a:endParaRPr lang="es-CR" dirty="0"/>
+              <a:rPr lang="es-CR" dirty="0"/>
+              <a:t>Lic. Santiago Rodríguez Paniagua. </a:t>
+            </a:r>
+            <a:r>
+              <a:rPr lang="es-CR"/>
+              <a:t>(2024</a:t>
+            </a:r>
+            <a:r>
+              <a:rPr lang="es-CR" dirty="0"/>
+              <a:t>)</a:t>
+            </a:r>
           </a:p>
         </p:txBody>
       </p:sp>
@@ -9083,13 +9105,6 @@
   <p:clrMapOvr>
     <a:masterClrMapping/>
   </p:clrMapOvr>
-  <p:timing>
-    <p:tnLst>
-      <p:par>
-        <p:cTn id="1" dur="indefinite" restart="never" nodeType="tmRoot"/>
-      </p:par>
-    </p:tnLst>
-  </p:timing>
 </p:sld>
 </file>
 
@@ -9126,18 +9141,9 @@
           <a:lstStyle/>
           <a:p>
             <a:r>
-              <a:rPr lang="es-CR" sz="4000" dirty="0" smtClean="0"/>
-              <a:t>Crear una </a:t>
-            </a:r>
-            <a:r>
               <a:rPr lang="es-CR" sz="4000" dirty="0"/>
-              <a:t>Aplicación de </a:t>
-            </a:r>
-            <a:r>
-              <a:rPr lang="es-CR" sz="4000" dirty="0" smtClean="0"/>
-              <a:t>Consola #1</a:t>
-            </a:r>
-            <a:endParaRPr lang="es-CR" sz="4000" dirty="0"/>
+              <a:t>Crear una Aplicación de Consola #1</a:t>
+            </a:r>
           </a:p>
         </p:txBody>
       </p:sp>
@@ -9267,18 +9273,17 @@
             <a:lstStyle/>
             <a:p>
               <a:r>
-                <a:rPr lang="es-CR" dirty="0" smtClean="0"/>
+                <a:rPr lang="es-CR" dirty="0"/>
                 <a:t>Ponemos el código entre las 2 llaves de la función </a:t>
               </a:r>
               <a:r>
-                <a:rPr lang="es-CR" dirty="0" err="1" smtClean="0"/>
+                <a:rPr lang="es-CR" dirty="0" err="1"/>
                 <a:t>Main</a:t>
               </a:r>
               <a:r>
-                <a:rPr lang="es-CR" dirty="0" smtClean="0"/>
+                <a:rPr lang="es-CR" dirty="0"/>
                 <a:t>.</a:t>
               </a:r>
-              <a:endParaRPr lang="es-CR" dirty="0"/>
             </a:p>
           </p:txBody>
         </p:sp>
@@ -9293,13 +9298,6 @@
   <p:clrMapOvr>
     <a:masterClrMapping/>
   </p:clrMapOvr>
-  <p:timing>
-    <p:tnLst>
-      <p:par>
-        <p:cTn id="1" dur="indefinite" restart="never" nodeType="tmRoot"/>
-      </p:par>
-    </p:tnLst>
-  </p:timing>
 </p:sld>
 </file>
 
@@ -9341,18 +9339,9 @@
           <a:lstStyle/>
           <a:p>
             <a:r>
-              <a:rPr lang="es-CR" sz="4000" dirty="0" smtClean="0"/>
-              <a:t>Crear una </a:t>
-            </a:r>
-            <a:r>
               <a:rPr lang="es-CR" sz="4000" dirty="0"/>
-              <a:t>Aplicación de </a:t>
-            </a:r>
-            <a:r>
-              <a:rPr lang="es-CR" sz="4000" dirty="0" smtClean="0"/>
-              <a:t>Consola #2</a:t>
-            </a:r>
-            <a:endParaRPr lang="es-CR" sz="4000" dirty="0"/>
+              <a:t>Crear una Aplicación de Consola #2</a:t>
+            </a:r>
           </a:p>
         </p:txBody>
       </p:sp>
@@ -9579,13 +9568,6 @@
   <p:clrMapOvr>
     <a:masterClrMapping/>
   </p:clrMapOvr>
-  <p:timing>
-    <p:tnLst>
-      <p:par>
-        <p:cTn id="1" dur="indefinite" restart="never" nodeType="tmRoot"/>
-      </p:par>
-    </p:tnLst>
-  </p:timing>
 </p:sld>
 </file>
 
@@ -9622,22 +9604,17 @@
           <a:lstStyle/>
           <a:p>
             <a:r>
-              <a:rPr lang="es-CR" sz="4000" dirty="0" smtClean="0"/>
-              <a:t>Crear una Aplicación </a:t>
-            </a:r>
-            <a:r>
               <a:rPr lang="es-CR" sz="4000" dirty="0"/>
-              <a:t>de Windows </a:t>
-            </a:r>
-            <a:r>
-              <a:rPr lang="es-CR" sz="4000" dirty="0" err="1" smtClean="0"/>
+              <a:t>Crear una Aplicación de Windows </a:t>
+            </a:r>
+            <a:r>
+              <a:rPr lang="es-CR" sz="4000" dirty="0" err="1"/>
               <a:t>Forms</a:t>
             </a:r>
             <a:r>
-              <a:rPr lang="es-CR" sz="4000" dirty="0" smtClean="0"/>
+              <a:rPr lang="es-CR" sz="4000" dirty="0"/>
               <a:t> #1</a:t>
             </a:r>
-            <a:endParaRPr lang="es-CR" sz="4000" dirty="0"/>
           </a:p>
         </p:txBody>
       </p:sp>
@@ -9705,13 +9682,6 @@
   <p:clrMapOvr>
     <a:masterClrMapping/>
   </p:clrMapOvr>
-  <p:timing>
-    <p:tnLst>
-      <p:par>
-        <p:cTn id="1" dur="indefinite" restart="never" nodeType="tmRoot"/>
-      </p:par>
-    </p:tnLst>
-  </p:timing>
 </p:sld>
 </file>
 
@@ -9753,22 +9723,17 @@
           <a:lstStyle/>
           <a:p>
             <a:r>
-              <a:rPr lang="es-CR" sz="3200" dirty="0" smtClean="0"/>
-              <a:t>Crear una Aplicación </a:t>
-            </a:r>
-            <a:r>
               <a:rPr lang="es-CR" sz="3200" dirty="0"/>
-              <a:t>de Windows </a:t>
-            </a:r>
-            <a:r>
-              <a:rPr lang="es-CR" sz="3200" dirty="0" err="1" smtClean="0"/>
+              <a:t>Crear una Aplicación de Windows </a:t>
+            </a:r>
+            <a:r>
+              <a:rPr lang="es-CR" sz="3200" dirty="0" err="1"/>
               <a:t>Forms</a:t>
             </a:r>
             <a:r>
-              <a:rPr lang="es-CR" sz="3200" dirty="0" smtClean="0"/>
+              <a:rPr lang="es-CR" sz="3200" dirty="0"/>
               <a:t> #2</a:t>
             </a:r>
-            <a:endParaRPr lang="es-CR" sz="3200" dirty="0"/>
           </a:p>
         </p:txBody>
       </p:sp>
@@ -9888,13 +9853,6 @@
   <p:clrMapOvr>
     <a:masterClrMapping/>
   </p:clrMapOvr>
-  <p:timing>
-    <p:tnLst>
-      <p:par>
-        <p:cTn id="1" dur="indefinite" restart="never" nodeType="tmRoot"/>
-      </p:par>
-    </p:tnLst>
-  </p:timing>
 </p:sld>
 </file>
 
@@ -9936,22 +9894,17 @@
           <a:lstStyle/>
           <a:p>
             <a:r>
-              <a:rPr lang="es-CR" sz="3200" dirty="0" smtClean="0"/>
-              <a:t>Crear una Aplicación </a:t>
-            </a:r>
-            <a:r>
               <a:rPr lang="es-CR" sz="3200" dirty="0"/>
-              <a:t>de Windows </a:t>
-            </a:r>
-            <a:r>
-              <a:rPr lang="es-CR" sz="3200" dirty="0" err="1" smtClean="0"/>
+              <a:t>Crear una Aplicación de Windows </a:t>
+            </a:r>
+            <a:r>
+              <a:rPr lang="es-CR" sz="3200" dirty="0" err="1"/>
               <a:t>Forms</a:t>
             </a:r>
             <a:r>
-              <a:rPr lang="es-CR" sz="3200" dirty="0" smtClean="0"/>
+              <a:rPr lang="es-CR" sz="3200" dirty="0"/>
               <a:t> #3</a:t>
             </a:r>
-            <a:endParaRPr lang="es-CR" sz="3200" dirty="0"/>
           </a:p>
         </p:txBody>
       </p:sp>
@@ -10100,10 +10053,9 @@
             <a:lstStyle/>
             <a:p>
               <a:r>
-                <a:rPr lang="es-CR" dirty="0" smtClean="0"/>
+                <a:rPr lang="es-CR" dirty="0"/>
                 <a:t>Seleccionamos el Formulario para cambiarle el nombre</a:t>
               </a:r>
-              <a:endParaRPr lang="es-CR" dirty="0"/>
             </a:p>
           </p:txBody>
         </p:sp>
@@ -10157,13 +10109,6 @@
   <p:clrMapOvr>
     <a:masterClrMapping/>
   </p:clrMapOvr>
-  <p:timing>
-    <p:tnLst>
-      <p:par>
-        <p:cTn id="1" dur="indefinite" restart="never" nodeType="tmRoot"/>
-      </p:par>
-    </p:tnLst>
-  </p:timing>
 </p:sld>
 </file>
 
@@ -10205,22 +10150,17 @@
           <a:lstStyle/>
           <a:p>
             <a:r>
-              <a:rPr lang="es-CR" sz="3200" dirty="0" smtClean="0"/>
-              <a:t>Crear una Aplicación </a:t>
-            </a:r>
-            <a:r>
               <a:rPr lang="es-CR" sz="3200" dirty="0"/>
-              <a:t>de Windows </a:t>
-            </a:r>
-            <a:r>
-              <a:rPr lang="es-CR" sz="3200" dirty="0" err="1" smtClean="0"/>
+              <a:t>Crear una Aplicación de Windows </a:t>
+            </a:r>
+            <a:r>
+              <a:rPr lang="es-CR" sz="3200" dirty="0" err="1"/>
               <a:t>Forms</a:t>
             </a:r>
             <a:r>
-              <a:rPr lang="es-CR" sz="3200" dirty="0" smtClean="0"/>
+              <a:rPr lang="es-CR" sz="3200" dirty="0"/>
               <a:t> #4</a:t>
             </a:r>
-            <a:endParaRPr lang="es-CR" sz="3200" dirty="0"/>
           </a:p>
         </p:txBody>
       </p:sp>
@@ -10315,10 +10255,9 @@
             <a:lstStyle/>
             <a:p>
               <a:r>
-                <a:rPr lang="es-CR" dirty="0" smtClean="0"/>
+                <a:rPr lang="es-CR" dirty="0"/>
                 <a:t>Seleccionamos el Formulario para cambiarle el título.</a:t>
               </a:r>
-              <a:endParaRPr lang="es-CR" dirty="0"/>
             </a:p>
           </p:txBody>
         </p:sp>
@@ -10372,13 +10311,6 @@
   <p:clrMapOvr>
     <a:masterClrMapping/>
   </p:clrMapOvr>
-  <p:timing>
-    <p:tnLst>
-      <p:par>
-        <p:cTn id="1" dur="indefinite" restart="never" nodeType="tmRoot"/>
-      </p:par>
-    </p:tnLst>
-  </p:timing>
 </p:sld>
 </file>
 
@@ -10420,22 +10352,17 @@
           <a:lstStyle/>
           <a:p>
             <a:r>
-              <a:rPr lang="es-CR" sz="3200" dirty="0" smtClean="0"/>
-              <a:t>Crear una Aplicación </a:t>
-            </a:r>
-            <a:r>
               <a:rPr lang="es-CR" sz="3200" dirty="0"/>
-              <a:t>de Windows </a:t>
-            </a:r>
-            <a:r>
-              <a:rPr lang="es-CR" sz="3200" dirty="0" err="1" smtClean="0"/>
+              <a:t>Crear una Aplicación de Windows </a:t>
+            </a:r>
+            <a:r>
+              <a:rPr lang="es-CR" sz="3200" dirty="0" err="1"/>
               <a:t>Forms</a:t>
             </a:r>
             <a:r>
-              <a:rPr lang="es-CR" sz="3200" dirty="0" smtClean="0"/>
+              <a:rPr lang="es-CR" sz="3200" dirty="0"/>
               <a:t> #5</a:t>
             </a:r>
-            <a:endParaRPr lang="es-CR" sz="3200" dirty="0"/>
           </a:p>
         </p:txBody>
       </p:sp>
@@ -10622,18 +10549,17 @@
           <a:lstStyle/>
           <a:p>
             <a:r>
-              <a:rPr lang="es-CR" dirty="0" smtClean="0"/>
+              <a:rPr lang="es-CR" dirty="0"/>
               <a:t>Ponemos el código entre las 2 llaves de la función del evento </a:t>
             </a:r>
             <a:r>
-              <a:rPr lang="es-CR" dirty="0" err="1" smtClean="0"/>
+              <a:rPr lang="es-CR" dirty="0" err="1"/>
               <a:t>click</a:t>
             </a:r>
             <a:r>
-              <a:rPr lang="es-CR" dirty="0" smtClean="0"/>
+              <a:rPr lang="es-CR" dirty="0"/>
               <a:t> del botón.</a:t>
             </a:r>
-            <a:endParaRPr lang="es-CR" dirty="0"/>
           </a:p>
         </p:txBody>
       </p:sp>
@@ -10647,13 +10573,6 @@
   <p:clrMapOvr>
     <a:masterClrMapping/>
   </p:clrMapOvr>
-  <p:timing>
-    <p:tnLst>
-      <p:par>
-        <p:cTn id="1" dur="indefinite" restart="never" nodeType="tmRoot"/>
-      </p:par>
-    </p:tnLst>
-  </p:timing>
 </p:sld>
 </file>
 
@@ -10695,23 +10614,23 @@
           <a:lstStyle/>
           <a:p>
             <a:r>
-              <a:rPr lang="en-US" sz="4000" dirty="0" err="1" smtClean="0"/>
+              <a:rPr lang="en-US" sz="4000" dirty="0" err="1"/>
               <a:t>Abrir</a:t>
             </a:r>
             <a:r>
-              <a:rPr lang="en-US" sz="4000" dirty="0" smtClean="0"/>
+              <a:rPr lang="en-US" sz="4000" dirty="0"/>
               <a:t> un </a:t>
             </a:r>
             <a:r>
-              <a:rPr lang="en-US" sz="4000" dirty="0" err="1" smtClean="0"/>
+              <a:rPr lang="en-US" sz="4000" dirty="0" err="1"/>
               <a:t>proyecto</a:t>
             </a:r>
             <a:r>
-              <a:rPr lang="en-US" sz="4000" dirty="0" smtClean="0"/>
+              <a:rPr lang="en-US" sz="4000" dirty="0"/>
               <a:t> </a:t>
             </a:r>
             <a:r>
-              <a:rPr lang="en-US" sz="4000" dirty="0" err="1" smtClean="0"/>
+              <a:rPr lang="en-US" sz="4000" dirty="0" err="1"/>
               <a:t>existente</a:t>
             </a:r>
             <a:endParaRPr lang="en-US" sz="4000" dirty="0"/>
@@ -10861,7 +10780,7 @@
             <a:lstStyle/>
             <a:p>
               <a:r>
-                <a:rPr lang="en-US" sz="1100" dirty="0" smtClean="0">
+                <a:rPr lang="en-US" sz="1100" dirty="0">
                   <a:solidFill>
                     <a:srgbClr val="FF0000"/>
                   </a:solidFill>
@@ -10870,7 +10789,7 @@
                 <a:t>#2 </a:t>
               </a:r>
               <a:r>
-                <a:rPr lang="en-US" sz="1100" dirty="0" err="1" smtClean="0">
+                <a:rPr lang="en-US" sz="1100" dirty="0" err="1">
                   <a:solidFill>
                     <a:srgbClr val="FF0000"/>
                   </a:solidFill>
@@ -10879,7 +10798,7 @@
                 <a:t>Abrirlo</a:t>
               </a:r>
               <a:r>
-                <a:rPr lang="en-US" sz="1100" dirty="0" smtClean="0">
+                <a:rPr lang="en-US" sz="1100" dirty="0">
                   <a:solidFill>
                     <a:srgbClr val="FF0000"/>
                   </a:solidFill>
@@ -10888,7 +10807,7 @@
                 <a:t> </a:t>
               </a:r>
               <a:r>
-                <a:rPr lang="en-US" sz="1100" dirty="0" err="1" smtClean="0">
+                <a:rPr lang="en-US" sz="1100" dirty="0" err="1">
                   <a:solidFill>
                     <a:srgbClr val="FF0000"/>
                   </a:solidFill>
@@ -10897,7 +10816,7 @@
                 <a:t>desde</a:t>
               </a:r>
               <a:r>
-                <a:rPr lang="en-US" sz="1100" dirty="0" smtClean="0">
+                <a:rPr lang="en-US" sz="1100" dirty="0">
                   <a:solidFill>
                     <a:srgbClr val="FF0000"/>
                   </a:solidFill>
@@ -10905,12 +10824,6 @@
                 </a:rPr>
                 <a:t> Visual Studio</a:t>
               </a:r>
-              <a:endParaRPr lang="en-US" sz="1100" dirty="0">
-                <a:solidFill>
-                  <a:srgbClr val="FF0000"/>
-                </a:solidFill>
-                <a:latin typeface="Arial Black" panose="020B0A04020102020204" pitchFamily="34" charset="0"/>
-              </a:endParaRPr>
             </a:p>
           </p:txBody>
         </p:sp>
@@ -10925,13 +10838,6 @@
   <p:clrMapOvr>
     <a:masterClrMapping/>
   </p:clrMapOvr>
-  <p:timing>
-    <p:tnLst>
-      <p:par>
-        <p:cTn id="1" dur="indefinite" restart="never" nodeType="tmRoot"/>
-      </p:par>
-    </p:tnLst>
-  </p:timing>
 </p:sld>
 </file>
 
@@ -10973,18 +10879,17 @@
           <a:lstStyle/>
           <a:p>
             <a:r>
-              <a:rPr lang="en-US" dirty="0" smtClean="0"/>
+              <a:rPr lang="en-US" dirty="0"/>
               <a:t>Leer de </a:t>
             </a:r>
             <a:r>
-              <a:rPr lang="en-US" dirty="0" err="1" smtClean="0"/>
+              <a:rPr lang="en-US" dirty="0" err="1"/>
               <a:t>Pantalla</a:t>
             </a:r>
             <a:r>
-              <a:rPr lang="en-US" dirty="0" smtClean="0"/>
+              <a:rPr lang="en-US" dirty="0"/>
               <a:t> #1</a:t>
             </a:r>
-            <a:endParaRPr lang="en-US" dirty="0"/>
           </a:p>
         </p:txBody>
       </p:sp>
@@ -11174,49 +11079,49 @@
             <a:lstStyle/>
             <a:p>
               <a:r>
-                <a:rPr lang="en-US" sz="1600" dirty="0" err="1" smtClean="0"/>
+                <a:rPr lang="en-US" sz="1600" dirty="0" err="1"/>
                 <a:t>Agreguemos</a:t>
               </a:r>
               <a:r>
-                <a:rPr lang="en-US" sz="1600" dirty="0" smtClean="0"/>
+                <a:rPr lang="en-US" sz="1600" dirty="0"/>
                 <a:t> </a:t>
               </a:r>
               <a:r>
-                <a:rPr lang="en-US" sz="1600" dirty="0" err="1" smtClean="0"/>
+                <a:rPr lang="en-US" sz="1600" dirty="0" err="1"/>
                 <a:t>algunos</a:t>
               </a:r>
               <a:r>
-                <a:rPr lang="en-US" sz="1600" dirty="0" smtClean="0"/>
+                <a:rPr lang="en-US" sz="1600" dirty="0"/>
                 <a:t> </a:t>
               </a:r>
               <a:r>
-                <a:rPr lang="en-US" sz="1600" dirty="0" err="1" smtClean="0"/>
+                <a:rPr lang="en-US" sz="1600" dirty="0" err="1"/>
                 <a:t>nuevos</a:t>
               </a:r>
               <a:r>
-                <a:rPr lang="en-US" sz="1600" dirty="0" smtClean="0"/>
+                <a:rPr lang="en-US" sz="1600" dirty="0"/>
                 <a:t> </a:t>
               </a:r>
             </a:p>
             <a:p>
               <a:r>
-                <a:rPr lang="en-US" sz="1600" dirty="0" err="1" smtClean="0"/>
+                <a:rPr lang="en-US" sz="1600" dirty="0" err="1"/>
                 <a:t>elementos</a:t>
               </a:r>
               <a:r>
-                <a:rPr lang="en-US" sz="1600" dirty="0" smtClean="0"/>
+                <a:rPr lang="en-US" sz="1600" dirty="0"/>
                 <a:t> a </a:t>
               </a:r>
               <a:r>
-                <a:rPr lang="en-US" sz="1600" dirty="0" err="1" smtClean="0"/>
+                <a:rPr lang="en-US" sz="1600" dirty="0" err="1"/>
                 <a:t>nuestra</a:t>
               </a:r>
               <a:r>
-                <a:rPr lang="en-US" sz="1600" dirty="0" smtClean="0"/>
+                <a:rPr lang="en-US" sz="1600" dirty="0"/>
                 <a:t> </a:t>
               </a:r>
               <a:r>
-                <a:rPr lang="en-US" sz="1600" dirty="0" err="1" smtClean="0"/>
+                <a:rPr lang="en-US" sz="1600" dirty="0" err="1"/>
                 <a:t>pantalla</a:t>
               </a:r>
               <a:endParaRPr lang="en-US" sz="1600" dirty="0"/>
@@ -11234,13 +11139,6 @@
   <p:clrMapOvr>
     <a:masterClrMapping/>
   </p:clrMapOvr>
-  <p:timing>
-    <p:tnLst>
-      <p:par>
-        <p:cTn id="1" dur="indefinite" restart="never" nodeType="tmRoot"/>
-      </p:par>
-    </p:tnLst>
-  </p:timing>
 </p:sld>
 </file>
 
@@ -11282,18 +11180,17 @@
           <a:lstStyle/>
           <a:p>
             <a:r>
-              <a:rPr lang="en-US" dirty="0" smtClean="0"/>
+              <a:rPr lang="en-US" dirty="0"/>
               <a:t>Leer de </a:t>
             </a:r>
             <a:r>
-              <a:rPr lang="en-US" dirty="0" err="1" smtClean="0"/>
+              <a:rPr lang="en-US" dirty="0" err="1"/>
               <a:t>Pantalla</a:t>
             </a:r>
             <a:r>
-              <a:rPr lang="en-US" dirty="0" smtClean="0"/>
+              <a:rPr lang="en-US" dirty="0"/>
               <a:t> #2</a:t>
             </a:r>
-            <a:endParaRPr lang="en-US" dirty="0"/>
           </a:p>
         </p:txBody>
       </p:sp>
@@ -11402,37 +11299,37 @@
             <a:lstStyle/>
             <a:p>
               <a:r>
-                <a:rPr lang="en-US" sz="1600" dirty="0" err="1" smtClean="0"/>
+                <a:rPr lang="en-US" sz="1600" dirty="0" err="1"/>
                 <a:t>Renombremos</a:t>
               </a:r>
               <a:r>
-                <a:rPr lang="en-US" sz="1600" dirty="0" smtClean="0"/>
+                <a:rPr lang="en-US" sz="1600" dirty="0"/>
                 <a:t> el campo de </a:t>
               </a:r>
               <a:r>
-                <a:rPr lang="en-US" sz="1600" dirty="0" err="1" smtClean="0"/>
+                <a:rPr lang="en-US" sz="1600" dirty="0" err="1"/>
                 <a:t>texto</a:t>
               </a:r>
               <a:r>
-                <a:rPr lang="en-US" sz="1600" dirty="0" smtClean="0"/>
+                <a:rPr lang="en-US" sz="1600" dirty="0"/>
                 <a:t> </a:t>
               </a:r>
             </a:p>
             <a:p>
               <a:r>
-                <a:rPr lang="en-US" sz="1600" dirty="0" smtClean="0"/>
+                <a:rPr lang="en-US" sz="1600" dirty="0"/>
                 <a:t>para leer de </a:t>
               </a:r>
               <a:r>
-                <a:rPr lang="en-US" sz="1600" dirty="0" err="1" smtClean="0"/>
+                <a:rPr lang="en-US" sz="1600" dirty="0" err="1"/>
                 <a:t>pantalla</a:t>
               </a:r>
               <a:r>
-                <a:rPr lang="en-US" sz="1600" dirty="0" smtClean="0"/>
+                <a:rPr lang="en-US" sz="1600" dirty="0"/>
                 <a:t> </a:t>
               </a:r>
               <a:r>
-                <a:rPr lang="en-US" sz="1600" dirty="0" err="1" smtClean="0"/>
+                <a:rPr lang="en-US" sz="1600" dirty="0" err="1"/>
                 <a:t>correctamente</a:t>
               </a:r>
               <a:endParaRPr lang="en-US" sz="1600" dirty="0"/>
@@ -11450,13 +11347,6 @@
   <p:clrMapOvr>
     <a:masterClrMapping/>
   </p:clrMapOvr>
-  <p:timing>
-    <p:tnLst>
-      <p:par>
-        <p:cTn id="1" dur="indefinite" restart="never" nodeType="tmRoot"/>
-      </p:par>
-    </p:tnLst>
-  </p:timing>
 </p:sld>
 </file>
 
@@ -11493,30 +11383,29 @@
           <a:lstStyle/>
           <a:p>
             <a:r>
-              <a:rPr lang="en-US" dirty="0" err="1" smtClean="0"/>
+              <a:rPr lang="en-US" dirty="0" err="1"/>
               <a:t>Que</a:t>
             </a:r>
             <a:r>
-              <a:rPr lang="en-US" dirty="0" smtClean="0"/>
+              <a:rPr lang="en-US" dirty="0"/>
               <a:t> </a:t>
             </a:r>
             <a:r>
-              <a:rPr lang="en-US" dirty="0" err="1" smtClean="0"/>
+              <a:rPr lang="en-US" dirty="0" err="1"/>
               <a:t>es</a:t>
             </a:r>
             <a:r>
-              <a:rPr lang="en-US" dirty="0" smtClean="0"/>
+              <a:rPr lang="en-US" dirty="0"/>
               <a:t> </a:t>
             </a:r>
             <a:r>
-              <a:rPr lang="en-US" dirty="0" err="1" smtClean="0"/>
+              <a:rPr lang="en-US" dirty="0" err="1"/>
               <a:t>programación</a:t>
             </a:r>
             <a:r>
-              <a:rPr lang="en-US" dirty="0" smtClean="0"/>
+              <a:rPr lang="en-US" dirty="0"/>
               <a:t>?</a:t>
             </a:r>
-            <a:endParaRPr lang="en-US" dirty="0"/>
           </a:p>
         </p:txBody>
       </p:sp>
@@ -11570,16 +11459,8 @@
           <a:lstStyle/>
           <a:p>
             <a:r>
-              <a:rPr lang="es-ES" dirty="0" smtClean="0"/>
-              <a:t>Es </a:t>
-            </a:r>
-            <a:r>
               <a:rPr lang="es-ES" dirty="0"/>
-              <a:t>el proceso de diseñar, codificar, depurar y mantener el código fuente de </a:t>
-            </a:r>
-            <a:r>
-              <a:rPr lang="es-ES" dirty="0" smtClean="0"/>
-              <a:t>un programa informático. </a:t>
+              <a:t>Es el proceso de diseñar, codificar, depurar y mantener el código fuente de un programa informático. </a:t>
             </a:r>
           </a:p>
           <a:p>
@@ -11587,26 +11468,17 @@
           </a:p>
           <a:p>
             <a:r>
-              <a:rPr lang="es-ES" dirty="0" smtClean="0"/>
-              <a:t>El </a:t>
-            </a:r>
-            <a:r>
               <a:rPr lang="es-ES" dirty="0"/>
-              <a:t>código fuente es escrito en un lenguaje de programación. </a:t>
-            </a:r>
-            <a:endParaRPr lang="es-ES" dirty="0" smtClean="0"/>
+              <a:t>El código fuente es escrito en un lenguaje de programación. </a:t>
+            </a:r>
           </a:p>
           <a:p>
             <a:endParaRPr lang="es-ES" dirty="0"/>
           </a:p>
           <a:p>
             <a:r>
-              <a:rPr lang="es-ES" dirty="0" smtClean="0"/>
-              <a:t>El </a:t>
-            </a:r>
-            <a:r>
               <a:rPr lang="es-ES" dirty="0"/>
-              <a:t>propósito de la programación es crear programas que exhiban un comportamiento deseado.</a:t>
+              <a:t>El propósito de la programación es crear programas que exhiban un comportamiento deseado.</a:t>
             </a:r>
             <a:endParaRPr lang="en-US" dirty="0"/>
           </a:p>
@@ -11622,13 +11494,6 @@
   <p:clrMapOvr>
     <a:masterClrMapping/>
   </p:clrMapOvr>
-  <p:timing>
-    <p:tnLst>
-      <p:par>
-        <p:cTn id="1" dur="indefinite" restart="never" nodeType="tmRoot"/>
-      </p:par>
-    </p:tnLst>
-  </p:timing>
 </p:sld>
 </file>
 
@@ -11670,18 +11535,17 @@
           <a:lstStyle/>
           <a:p>
             <a:r>
-              <a:rPr lang="en-US" dirty="0" smtClean="0"/>
+              <a:rPr lang="en-US" dirty="0"/>
               <a:t>Leer de </a:t>
             </a:r>
             <a:r>
-              <a:rPr lang="en-US" dirty="0" err="1" smtClean="0"/>
+              <a:rPr lang="en-US" dirty="0" err="1"/>
               <a:t>Pantalla</a:t>
             </a:r>
             <a:r>
-              <a:rPr lang="en-US" dirty="0" smtClean="0"/>
+              <a:rPr lang="en-US" dirty="0"/>
               <a:t> #3</a:t>
             </a:r>
-            <a:endParaRPr lang="en-US" dirty="0"/>
           </a:p>
         </p:txBody>
       </p:sp>
@@ -11864,18 +11728,17 @@
           <a:lstStyle/>
           <a:p>
             <a:r>
-              <a:rPr lang="es-CR" dirty="0" smtClean="0"/>
+              <a:rPr lang="es-CR" dirty="0"/>
               <a:t>Ponemos el código entre las 2 llaves de la función del evento </a:t>
             </a:r>
             <a:r>
-              <a:rPr lang="es-CR" dirty="0" err="1" smtClean="0"/>
+              <a:rPr lang="es-CR" dirty="0" err="1"/>
               <a:t>click</a:t>
             </a:r>
             <a:r>
-              <a:rPr lang="es-CR" dirty="0" smtClean="0"/>
+              <a:rPr lang="es-CR" dirty="0"/>
               <a:t> del botón.</a:t>
             </a:r>
-            <a:endParaRPr lang="es-CR" dirty="0"/>
           </a:p>
         </p:txBody>
       </p:sp>
@@ -11889,13 +11752,6 @@
   <p:clrMapOvr>
     <a:masterClrMapping/>
   </p:clrMapOvr>
-  <p:timing>
-    <p:tnLst>
-      <p:par>
-        <p:cTn id="1" dur="indefinite" restart="never" nodeType="tmRoot"/>
-      </p:par>
-    </p:tnLst>
-  </p:timing>
 </p:sld>
 </file>
 
@@ -11937,25 +11793,24 @@
           <a:lstStyle/>
           <a:p>
             <a:r>
-              <a:rPr lang="es-CR" sz="4000" dirty="0" smtClean="0"/>
+              <a:rPr lang="es-CR" sz="4000" dirty="0"/>
               <a:t>Ejemplo de Entrada y Salida con Java </a:t>
             </a:r>
             <a:br>
-              <a:rPr lang="es-CR" sz="4000" dirty="0" smtClean="0"/>
+              <a:rPr lang="es-CR" sz="4000" dirty="0"/>
             </a:br>
             <a:r>
-              <a:rPr lang="es-CR" sz="4000" dirty="0" smtClean="0"/>
+              <a:rPr lang="es-CR" sz="4000" dirty="0"/>
               <a:t>(con </a:t>
             </a:r>
             <a:r>
-              <a:rPr lang="es-CR" sz="4000" dirty="0" err="1" smtClean="0"/>
+              <a:rPr lang="es-CR" sz="4000" dirty="0" err="1"/>
               <a:t>NetBeans</a:t>
             </a:r>
             <a:r>
-              <a:rPr lang="es-CR" sz="4000" dirty="0" smtClean="0"/>
+              <a:rPr lang="es-CR" sz="4000" dirty="0"/>
               <a:t>)</a:t>
             </a:r>
-            <a:endParaRPr lang="es-CR" sz="4000" dirty="0"/>
           </a:p>
         </p:txBody>
       </p:sp>
@@ -11999,13 +11854,6 @@
   <p:clrMapOvr>
     <a:masterClrMapping/>
   </p:clrMapOvr>
-  <p:timing>
-    <p:tnLst>
-      <p:par>
-        <p:cTn id="1" dur="indefinite" restart="never" nodeType="tmRoot"/>
-      </p:par>
-    </p:tnLst>
-  </p:timing>
 </p:sld>
 </file>
 
@@ -12042,10 +11890,9 @@
           <a:lstStyle/>
           <a:p>
             <a:r>
-              <a:rPr lang="es-CR" sz="4000" dirty="0" smtClean="0"/>
+              <a:rPr lang="es-CR" sz="4000" dirty="0"/>
               <a:t>Como Crear un nuevo Proyecto #1</a:t>
             </a:r>
-            <a:endParaRPr lang="es-CR" sz="4000" dirty="0"/>
           </a:p>
         </p:txBody>
       </p:sp>
@@ -12084,28 +11931,24 @@
               <a:t> es el punto de inicio para la creación de aplicaciones, componentes y servicios en </a:t>
             </a:r>
             <a:r>
-              <a:rPr lang="es-ES" b="1" dirty="0" err="1" smtClean="0"/>
+              <a:rPr lang="es-ES" b="1" dirty="0" err="1"/>
               <a:t>NetBeans</a:t>
             </a:r>
             <a:r>
-              <a:rPr lang="es-ES" b="1" dirty="0" smtClean="0"/>
+              <a:rPr lang="es-ES" b="1" dirty="0"/>
               <a:t> </a:t>
             </a:r>
             <a:r>
-              <a:rPr lang="es-ES" dirty="0" smtClean="0"/>
+              <a:rPr lang="es-ES" dirty="0"/>
               <a:t>que</a:t>
             </a:r>
             <a:r>
-              <a:rPr lang="es-ES" b="1" dirty="0" smtClean="0"/>
+              <a:rPr lang="es-ES" b="1" dirty="0"/>
               <a:t> </a:t>
             </a:r>
             <a:r>
               <a:rPr lang="es-ES" dirty="0"/>
-              <a:t>actúa como un contenedor que administra el código fuente, las conexiones de datos y las </a:t>
-            </a:r>
-            <a:r>
-              <a:rPr lang="es-ES" dirty="0" smtClean="0"/>
-              <a:t>referencias.</a:t>
+              <a:t>actúa como un contenedor que administra el código fuente, las conexiones de datos y las referencias.</a:t>
             </a:r>
             <a:endParaRPr lang="en-US" dirty="0"/>
           </a:p>
@@ -12229,13 +12072,6 @@
   <p:clrMapOvr>
     <a:masterClrMapping/>
   </p:clrMapOvr>
-  <p:timing>
-    <p:tnLst>
-      <p:par>
-        <p:cTn id="1" dur="indefinite" restart="never" nodeType="tmRoot"/>
-      </p:par>
-    </p:tnLst>
-  </p:timing>
 </p:sld>
 </file>
 
@@ -12277,10 +12113,9 @@
           <a:lstStyle/>
           <a:p>
             <a:r>
-              <a:rPr lang="es-CR" sz="4000" dirty="0" smtClean="0"/>
+              <a:rPr lang="es-CR" sz="4000" dirty="0"/>
               <a:t>Como Crear un nuevo Proyecto #2</a:t>
             </a:r>
-            <a:endParaRPr lang="es-CR" sz="4000" dirty="0"/>
           </a:p>
         </p:txBody>
       </p:sp>
@@ -12417,13 +12252,6 @@
   <p:clrMapOvr>
     <a:masterClrMapping/>
   </p:clrMapOvr>
-  <p:timing>
-    <p:tnLst>
-      <p:par>
-        <p:cTn id="1" dur="indefinite" restart="never" nodeType="tmRoot"/>
-      </p:par>
-    </p:tnLst>
-  </p:timing>
 </p:sld>
 </file>
 
@@ -12465,10 +12293,9 @@
           <a:lstStyle/>
           <a:p>
             <a:r>
-              <a:rPr lang="es-CR" sz="3200" dirty="0" smtClean="0"/>
+              <a:rPr lang="es-CR" sz="3200" dirty="0"/>
               <a:t>Agregar un formulario</a:t>
             </a:r>
-            <a:endParaRPr lang="es-CR" sz="3200" dirty="0"/>
           </a:p>
         </p:txBody>
       </p:sp>
@@ -12536,13 +12363,6 @@
   <p:clrMapOvr>
     <a:masterClrMapping/>
   </p:clrMapOvr>
-  <p:timing>
-    <p:tnLst>
-      <p:par>
-        <p:cTn id="1" dur="indefinite" restart="never" nodeType="tmRoot"/>
-      </p:par>
-    </p:tnLst>
-  </p:timing>
 </p:sld>
 </file>
 
@@ -12584,10 +12404,9 @@
           <a:lstStyle/>
           <a:p>
             <a:r>
-              <a:rPr lang="es-CR" sz="3200" dirty="0" smtClean="0"/>
+              <a:rPr lang="es-CR" sz="3200" dirty="0"/>
               <a:t>Agregamos algunos elementos al formulario</a:t>
             </a:r>
-            <a:endParaRPr lang="es-CR" sz="3200" dirty="0"/>
           </a:p>
         </p:txBody>
       </p:sp>
@@ -12781,13 +12600,6 @@
   <p:clrMapOvr>
     <a:masterClrMapping/>
   </p:clrMapOvr>
-  <p:timing>
-    <p:tnLst>
-      <p:par>
-        <p:cTn id="1" dur="indefinite" restart="never" nodeType="tmRoot"/>
-      </p:par>
-    </p:tnLst>
-  </p:timing>
 </p:sld>
 </file>
 
@@ -12829,10 +12641,9 @@
           <a:lstStyle/>
           <a:p>
             <a:r>
-              <a:rPr lang="es-CR" sz="3200" dirty="0" smtClean="0"/>
+              <a:rPr lang="es-CR" sz="3200" dirty="0"/>
               <a:t>Le agregamos acción al botón</a:t>
             </a:r>
-            <a:endParaRPr lang="es-CR" sz="3200" dirty="0"/>
           </a:p>
         </p:txBody>
       </p:sp>
@@ -13016,42 +12827,41 @@
             <a:lstStyle/>
             <a:p>
               <a:r>
-                <a:rPr lang="es-CR" sz="1600" dirty="0" smtClean="0"/>
+                <a:rPr lang="es-CR" sz="1600" dirty="0"/>
                 <a:t>Damos </a:t>
               </a:r>
               <a:r>
-                <a:rPr lang="es-CR" sz="1600" dirty="0" err="1" smtClean="0"/>
+                <a:rPr lang="es-CR" sz="1600" dirty="0" err="1"/>
                 <a:t>click</a:t>
               </a:r>
               <a:r>
-                <a:rPr lang="es-CR" sz="1600" dirty="0" smtClean="0"/>
+                <a:rPr lang="es-CR" sz="1600" dirty="0"/>
                 <a:t> derecho al botón y seleccionamos la opción: </a:t>
               </a:r>
               <a:r>
-                <a:rPr lang="es-CR" sz="1600" dirty="0" err="1" smtClean="0"/>
+                <a:rPr lang="es-CR" sz="1600" dirty="0" err="1"/>
                 <a:t>Events</a:t>
               </a:r>
               <a:r>
-                <a:rPr lang="es-CR" sz="1600" dirty="0" smtClean="0"/>
+                <a:rPr lang="es-CR" sz="1600" dirty="0"/>
                 <a:t>, luego </a:t>
               </a:r>
               <a:r>
-                <a:rPr lang="es-CR" sz="1600" dirty="0" err="1" smtClean="0"/>
+                <a:rPr lang="es-CR" sz="1600" dirty="0" err="1"/>
                 <a:t>Action</a:t>
               </a:r>
               <a:r>
-                <a:rPr lang="es-CR" sz="1600" dirty="0" smtClean="0"/>
+                <a:rPr lang="es-CR" sz="1600" dirty="0"/>
                 <a:t> y seleccionamos el evento: </a:t>
               </a:r>
               <a:r>
-                <a:rPr lang="es-CR" sz="1600" dirty="0" err="1" smtClean="0"/>
+                <a:rPr lang="es-CR" sz="1600" dirty="0" err="1"/>
                 <a:t>actionPermormed</a:t>
               </a:r>
               <a:r>
-                <a:rPr lang="es-CR" sz="1600" dirty="0" smtClean="0"/>
+                <a:rPr lang="es-CR" sz="1600" dirty="0"/>
                 <a:t> del botón.</a:t>
               </a:r>
-              <a:endParaRPr lang="es-CR" sz="1600" dirty="0"/>
             </a:p>
           </p:txBody>
         </p:sp>
@@ -13091,18 +12901,17 @@
             <a:lstStyle/>
             <a:p>
               <a:r>
-                <a:rPr lang="es-CR" sz="1600" dirty="0" smtClean="0"/>
+                <a:rPr lang="es-CR" sz="1600" dirty="0"/>
                 <a:t>Ponemos el código entre las 2 llaves de la función del evento </a:t>
               </a:r>
               <a:r>
-                <a:rPr lang="es-CR" sz="1600" dirty="0" err="1" smtClean="0"/>
+                <a:rPr lang="es-CR" sz="1600" dirty="0" err="1"/>
                 <a:t>click</a:t>
               </a:r>
               <a:r>
-                <a:rPr lang="es-CR" sz="1600" dirty="0" smtClean="0"/>
+                <a:rPr lang="es-CR" sz="1600" dirty="0"/>
                 <a:t> del botón.</a:t>
               </a:r>
-              <a:endParaRPr lang="es-CR" sz="1600" dirty="0"/>
             </a:p>
           </p:txBody>
         </p:sp>
@@ -13117,13 +12926,6 @@
   <p:clrMapOvr>
     <a:masterClrMapping/>
   </p:clrMapOvr>
-  <p:timing>
-    <p:tnLst>
-      <p:par>
-        <p:cTn id="1" dur="indefinite" restart="never" nodeType="tmRoot"/>
-      </p:par>
-    </p:tnLst>
-  </p:timing>
 </p:sld>
 </file>
 
@@ -13165,38 +12967,37 @@
           <a:lstStyle/>
           <a:p>
             <a:r>
-              <a:rPr lang="en-US" sz="4000" dirty="0" err="1" smtClean="0"/>
+              <a:rPr lang="en-US" sz="4000" dirty="0" err="1"/>
               <a:t>Que</a:t>
             </a:r>
             <a:r>
-              <a:rPr lang="en-US" sz="4000" dirty="0" smtClean="0"/>
+              <a:rPr lang="en-US" sz="4000" dirty="0"/>
               <a:t> </a:t>
             </a:r>
             <a:r>
-              <a:rPr lang="en-US" sz="4000" dirty="0" err="1" smtClean="0"/>
+              <a:rPr lang="en-US" sz="4000" dirty="0" err="1"/>
               <a:t>es</a:t>
             </a:r>
             <a:r>
-              <a:rPr lang="en-US" sz="4000" dirty="0" smtClean="0"/>
+              <a:rPr lang="en-US" sz="4000" dirty="0"/>
               <a:t> un </a:t>
             </a:r>
             <a:r>
-              <a:rPr lang="en-US" sz="4000" dirty="0" err="1" smtClean="0"/>
+              <a:rPr lang="en-US" sz="4000" dirty="0" err="1"/>
               <a:t>programa</a:t>
             </a:r>
             <a:r>
-              <a:rPr lang="en-US" sz="4000" dirty="0" smtClean="0"/>
+              <a:rPr lang="en-US" sz="4000" dirty="0"/>
               <a:t> </a:t>
             </a:r>
             <a:r>
-              <a:rPr lang="en-US" sz="4000" dirty="0" err="1" smtClean="0"/>
+              <a:rPr lang="en-US" sz="4000" dirty="0" err="1"/>
               <a:t>Informático</a:t>
             </a:r>
             <a:r>
-              <a:rPr lang="en-US" sz="4000" dirty="0" smtClean="0"/>
+              <a:rPr lang="en-US" sz="4000" dirty="0"/>
               <a:t>? </a:t>
             </a:r>
-            <a:endParaRPr lang="en-US" sz="4000" dirty="0"/>
           </a:p>
         </p:txBody>
       </p:sp>
@@ -13221,26 +13022,17 @@
           <a:lstStyle/>
           <a:p>
             <a:r>
-              <a:rPr lang="es-ES" dirty="0" smtClean="0"/>
-              <a:t>Es un</a:t>
-            </a:r>
-            <a:r>
               <a:rPr lang="es-ES" dirty="0"/>
-              <a:t> conjunto de instrucciones que una vez ejecutadas realizarán una o varias tareas en una computadora. </a:t>
-            </a:r>
-            <a:endParaRPr lang="es-ES" dirty="0" smtClean="0"/>
-          </a:p>
-          <a:p>
-            <a:endParaRPr lang="es-ES" dirty="0" smtClean="0"/>
-          </a:p>
-          <a:p>
-            <a:r>
-              <a:rPr lang="en-US" dirty="0" smtClean="0"/>
-              <a:t>Si </a:t>
-            </a:r>
+              <a:t>Es un conjunto de instrucciones que una vez ejecutadas realizarán una o varias tareas en una computadora. </a:t>
+            </a:r>
+          </a:p>
+          <a:p>
+            <a:endParaRPr lang="es-ES" dirty="0"/>
+          </a:p>
+          <a:p>
             <a:r>
               <a:rPr lang="en-US" dirty="0"/>
-              <a:t>un </a:t>
+              <a:t>Si un </a:t>
             </a:r>
             <a:r>
               <a:rPr lang="en-US" dirty="0" err="1"/>
@@ -13445,13 +13237,6 @@
   <p:clrMapOvr>
     <a:masterClrMapping/>
   </p:clrMapOvr>
-  <p:timing>
-    <p:tnLst>
-      <p:par>
-        <p:cTn id="1" dur="indefinite" restart="never" nodeType="tmRoot"/>
-      </p:par>
-    </p:tnLst>
-  </p:timing>
 </p:sld>
 </file>
 
@@ -13488,38 +13273,37 @@
           <a:lstStyle/>
           <a:p>
             <a:r>
-              <a:rPr lang="en-US" dirty="0" err="1" smtClean="0"/>
+              <a:rPr lang="en-US" dirty="0" err="1"/>
               <a:t>Que</a:t>
             </a:r>
             <a:r>
-              <a:rPr lang="en-US" dirty="0" smtClean="0"/>
+              <a:rPr lang="en-US" dirty="0"/>
               <a:t> </a:t>
             </a:r>
             <a:r>
-              <a:rPr lang="en-US" dirty="0" err="1" smtClean="0"/>
+              <a:rPr lang="en-US" dirty="0" err="1"/>
               <a:t>es</a:t>
             </a:r>
             <a:r>
-              <a:rPr lang="en-US" dirty="0" smtClean="0"/>
+              <a:rPr lang="en-US" dirty="0"/>
               <a:t> un </a:t>
             </a:r>
             <a:r>
-              <a:rPr lang="en-US" dirty="0" err="1" smtClean="0"/>
+              <a:rPr lang="en-US" dirty="0" err="1"/>
               <a:t>Lenguaje</a:t>
             </a:r>
             <a:r>
-              <a:rPr lang="en-US" dirty="0" smtClean="0"/>
+              <a:rPr lang="en-US" dirty="0"/>
               <a:t> de </a:t>
             </a:r>
             <a:r>
-              <a:rPr lang="en-US" dirty="0" err="1" smtClean="0"/>
+              <a:rPr lang="en-US" dirty="0" err="1"/>
               <a:t>Programación</a:t>
             </a:r>
             <a:r>
-              <a:rPr lang="en-US" dirty="0" smtClean="0"/>
+              <a:rPr lang="en-US" dirty="0"/>
               <a:t>? #1</a:t>
             </a:r>
-            <a:endParaRPr lang="en-US" dirty="0"/>
           </a:p>
         </p:txBody>
       </p:sp>
@@ -13546,7 +13330,7 @@
           <a:lstStyle/>
           <a:p>
             <a:r>
-              <a:rPr lang="es-ES" dirty="0" smtClean="0"/>
+              <a:rPr lang="es-ES" dirty="0"/>
               <a:t>Para crear un programa, y que la computadora lo interprete y ejecute las instrucciones escritas en él, debe usarse un lenguaje de programación.  </a:t>
             </a:r>
           </a:p>
@@ -13808,10 +13592,10 @@
           </a:lstStyle>
           <a:p>
             <a:r>
-              <a:rPr lang="es-ES" dirty="0" smtClean="0"/>
+              <a:rPr lang="es-ES" dirty="0"/>
               <a:t>En sus inicios las computadoras interpretaban sólo instrucciones en un lenguaje específico, el lenguaje máquina que sólo consiste en cadenas de números 1 y 0 (sistema binario).</a:t>
             </a:r>
-            <a:endParaRPr lang="en-US" dirty="0" smtClean="0"/>
+            <a:endParaRPr lang="en-US" dirty="0"/>
           </a:p>
           <a:p>
             <a:endParaRPr lang="en-US" dirty="0"/>
@@ -13828,13 +13612,6 @@
   <p:clrMapOvr>
     <a:masterClrMapping/>
   </p:clrMapOvr>
-  <p:timing>
-    <p:tnLst>
-      <p:par>
-        <p:cTn id="1" dur="indefinite" restart="never" nodeType="tmRoot"/>
-      </p:par>
-    </p:tnLst>
-  </p:timing>
 </p:sld>
 </file>
 
@@ -13871,38 +13648,37 @@
           <a:lstStyle/>
           <a:p>
             <a:r>
-              <a:rPr lang="en-US" dirty="0" err="1" smtClean="0"/>
+              <a:rPr lang="en-US" dirty="0" err="1"/>
               <a:t>Que</a:t>
             </a:r>
             <a:r>
-              <a:rPr lang="en-US" dirty="0" smtClean="0"/>
+              <a:rPr lang="en-US" dirty="0"/>
               <a:t> </a:t>
             </a:r>
             <a:r>
-              <a:rPr lang="en-US" dirty="0" err="1" smtClean="0"/>
+              <a:rPr lang="en-US" dirty="0" err="1"/>
               <a:t>es</a:t>
             </a:r>
             <a:r>
-              <a:rPr lang="en-US" dirty="0" smtClean="0"/>
+              <a:rPr lang="en-US" dirty="0"/>
               <a:t> un </a:t>
             </a:r>
             <a:r>
-              <a:rPr lang="en-US" dirty="0" err="1" smtClean="0"/>
+              <a:rPr lang="en-US" dirty="0" err="1"/>
               <a:t>Lenguaje</a:t>
             </a:r>
             <a:r>
-              <a:rPr lang="en-US" dirty="0" smtClean="0"/>
+              <a:rPr lang="en-US" dirty="0"/>
               <a:t> de </a:t>
             </a:r>
             <a:r>
-              <a:rPr lang="en-US" dirty="0" err="1" smtClean="0"/>
+              <a:rPr lang="en-US" dirty="0" err="1"/>
               <a:t>Programación</a:t>
             </a:r>
             <a:r>
-              <a:rPr lang="en-US" dirty="0" smtClean="0"/>
+              <a:rPr lang="en-US" dirty="0"/>
               <a:t>? #2</a:t>
             </a:r>
-            <a:endParaRPr lang="en-US" dirty="0"/>
           </a:p>
         </p:txBody>
       </p:sp>
@@ -13929,24 +13705,8 @@
           <a:lstStyle/>
           <a:p>
             <a:r>
-              <a:rPr lang="es-ES" dirty="0" smtClean="0"/>
-              <a:t>Existen </a:t>
-            </a:r>
-            <a:r>
               <a:rPr lang="es-ES" dirty="0"/>
-              <a:t>dos tipos principales de traductores de los lenguajes de programación de alto nivel: </a:t>
-            </a:r>
-            <a:r>
-              <a:rPr lang="es-ES" dirty="0" smtClean="0"/>
-              <a:t>Compiladores </a:t>
-            </a:r>
-            <a:r>
-              <a:rPr lang="es-ES" dirty="0"/>
-              <a:t>e </a:t>
-            </a:r>
-            <a:r>
-              <a:rPr lang="es-ES" dirty="0" smtClean="0"/>
-              <a:t>intérpretes.</a:t>
+              <a:t>Existen dos tipos principales de traductores de los lenguajes de programación de alto nivel: Compiladores e intérpretes.</a:t>
             </a:r>
           </a:p>
           <a:p>
@@ -13959,26 +13719,14 @@
             </a:r>
             <a:r>
               <a:rPr lang="es-ES" dirty="0"/>
-              <a:t>, </a:t>
-            </a:r>
-            <a:r>
-              <a:rPr lang="es-ES" dirty="0" smtClean="0"/>
-              <a:t>Su </a:t>
+              <a:t>, Su acción equivale a la de un traductor humano, que toma un libro y produce otro equivalente escrito en otra lengua. Ejemplo: </a:t>
+            </a:r>
+            <a:r>
+              <a:rPr lang="es-ES" b="1" dirty="0"/>
+              <a:t>C#</a:t>
             </a:r>
             <a:r>
               <a:rPr lang="es-ES" dirty="0"/>
-              <a:t>acción equivale a la de un traductor humano, que toma un libro y produce otro equivalente escrito en otra lengua</a:t>
-            </a:r>
-            <a:r>
-              <a:rPr lang="es-ES" dirty="0" smtClean="0"/>
-              <a:t>. Ejemplo: </a:t>
-            </a:r>
-            <a:r>
-              <a:rPr lang="es-ES" b="1" dirty="0" smtClean="0"/>
-              <a:t>C#</a:t>
-            </a:r>
-            <a:r>
-              <a:rPr lang="es-ES" dirty="0" smtClean="0"/>
               <a:t>.</a:t>
             </a:r>
           </a:p>
@@ -13986,7 +13734,7 @@
             <a:pPr marL="0" indent="0">
               <a:buNone/>
             </a:pPr>
-            <a:endParaRPr lang="es-ES" dirty="0" smtClean="0"/>
+            <a:endParaRPr lang="es-ES" dirty="0"/>
           </a:p>
           <a:p>
             <a:r>
@@ -13995,37 +13743,24 @@
             </a:r>
             <a:r>
               <a:rPr lang="es-ES" dirty="0"/>
-              <a:t>, </a:t>
-            </a:r>
-            <a:r>
-              <a:rPr lang="es-ES" dirty="0" smtClean="0"/>
-              <a:t> Su </a:t>
+              <a:t>,  Su acción equivale a la de un intérprete humano, que traduce las frases que oye sobre la marcha, sin producir ningún escrito permanente.  Ejemplos: </a:t>
+            </a:r>
+            <a:r>
+              <a:rPr lang="es-ES" b="1" dirty="0"/>
+              <a:t>Java</a:t>
             </a:r>
             <a:r>
               <a:rPr lang="es-ES" dirty="0"/>
-              <a:t>acción equivale a la de un intérprete humano, que traduce las frases que oye sobre la marcha, sin producir ningún escrito permanente. </a:t>
-            </a:r>
-            <a:r>
-              <a:rPr lang="es-ES" dirty="0" smtClean="0"/>
-              <a:t> Ejemplos: </a:t>
-            </a:r>
-            <a:r>
-              <a:rPr lang="es-ES" b="1" dirty="0" smtClean="0"/>
-              <a:t>Java</a:t>
-            </a:r>
-            <a:r>
-              <a:rPr lang="es-ES" dirty="0" smtClean="0"/>
               <a:t> y</a:t>
             </a:r>
             <a:r>
-              <a:rPr lang="es-ES" b="1" dirty="0" smtClean="0"/>
+              <a:rPr lang="es-ES" b="1" dirty="0"/>
               <a:t> JavaScript</a:t>
             </a:r>
             <a:r>
-              <a:rPr lang="es-ES" dirty="0" smtClean="0"/>
+              <a:rPr lang="es-ES" dirty="0"/>
               <a:t>.</a:t>
             </a:r>
-            <a:endParaRPr lang="es-ES" dirty="0"/>
           </a:p>
           <a:p>
             <a:endParaRPr lang="es-ES" dirty="0"/>
@@ -14045,13 +13780,6 @@
   <p:clrMapOvr>
     <a:masterClrMapping/>
   </p:clrMapOvr>
-  <p:timing>
-    <p:tnLst>
-      <p:par>
-        <p:cTn id="1" dur="indefinite" restart="never" nodeType="tmRoot"/>
-      </p:par>
-    </p:tnLst>
-  </p:timing>
 </p:sld>
 </file>
 
@@ -14093,10 +13821,9 @@
           <a:lstStyle/>
           <a:p>
             <a:r>
-              <a:rPr lang="es-CR" sz="4000" dirty="0" smtClean="0"/>
+              <a:rPr lang="es-CR" sz="4000" dirty="0"/>
               <a:t>Ejemplo de Entrada y Salida con C#</a:t>
             </a:r>
-            <a:endParaRPr lang="es-CR" sz="4000" dirty="0"/>
           </a:p>
         </p:txBody>
       </p:sp>
@@ -14140,13 +13867,6 @@
   <p:clrMapOvr>
     <a:masterClrMapping/>
   </p:clrMapOvr>
-  <p:timing>
-    <p:tnLst>
-      <p:par>
-        <p:cTn id="1" dur="indefinite" restart="never" nodeType="tmRoot"/>
-      </p:par>
-    </p:tnLst>
-  </p:timing>
 </p:sld>
 </file>
 
@@ -14183,10 +13903,9 @@
           <a:lstStyle/>
           <a:p>
             <a:r>
-              <a:rPr lang="es-CR" sz="4000" dirty="0" smtClean="0"/>
+              <a:rPr lang="es-CR" sz="4000" dirty="0"/>
               <a:t>Como Crear un nuevo Proyecto #1</a:t>
             </a:r>
-            <a:endParaRPr lang="es-CR" sz="4000" dirty="0"/>
           </a:p>
         </p:txBody>
       </p:sp>
@@ -14333,24 +14052,20 @@
               <a:t> es el punto de inicio para la creación de aplicaciones, componentes y servicios en </a:t>
             </a:r>
             <a:r>
-              <a:rPr lang="es-ES" b="1" dirty="0" smtClean="0"/>
+              <a:rPr lang="es-ES" b="1" dirty="0"/>
               <a:t>Visual Studio </a:t>
             </a:r>
             <a:r>
-              <a:rPr lang="es-ES" dirty="0" smtClean="0"/>
+              <a:rPr lang="es-ES" dirty="0"/>
               <a:t>que</a:t>
             </a:r>
             <a:r>
-              <a:rPr lang="es-ES" b="1" dirty="0" smtClean="0"/>
+              <a:rPr lang="es-ES" b="1" dirty="0"/>
               <a:t> </a:t>
             </a:r>
             <a:r>
               <a:rPr lang="es-ES" dirty="0"/>
-              <a:t>actúa como un contenedor que administra el código fuente, las conexiones de datos y las </a:t>
-            </a:r>
-            <a:r>
-              <a:rPr lang="es-ES" dirty="0" smtClean="0"/>
-              <a:t>referencias.</a:t>
+              <a:t>actúa como un contenedor que administra el código fuente, las conexiones de datos y las referencias.</a:t>
             </a:r>
             <a:endParaRPr lang="en-US" dirty="0"/>
           </a:p>
@@ -14366,13 +14081,6 @@
   <p:clrMapOvr>
     <a:masterClrMapping/>
   </p:clrMapOvr>
-  <p:timing>
-    <p:tnLst>
-      <p:par>
-        <p:cTn id="1" dur="indefinite" restart="never" nodeType="tmRoot"/>
-      </p:par>
-    </p:tnLst>
-  </p:timing>
 </p:sld>
 </file>
 
@@ -14409,10 +14117,9 @@
           <a:lstStyle/>
           <a:p>
             <a:r>
-              <a:rPr lang="es-CR" sz="4000" dirty="0" smtClean="0"/>
+              <a:rPr lang="es-CR" sz="4000" dirty="0"/>
               <a:t>Como Crear un nuevo Proyecto #2</a:t>
             </a:r>
-            <a:endParaRPr lang="es-CR" sz="4000" dirty="0"/>
           </a:p>
         </p:txBody>
       </p:sp>
@@ -14480,13 +14187,6 @@
   <p:clrMapOvr>
     <a:masterClrMapping/>
   </p:clrMapOvr>
-  <p:timing>
-    <p:tnLst>
-      <p:par>
-        <p:cTn id="1" dur="indefinite" restart="never" nodeType="tmRoot"/>
-      </p:par>
-    </p:tnLst>
-  </p:timing>
 </p:sld>
 </file>
 
@@ -14523,10 +14223,9 @@
           <a:lstStyle/>
           <a:p>
             <a:r>
-              <a:rPr lang="es-CR" dirty="0" smtClean="0"/>
+              <a:rPr lang="es-CR" dirty="0"/>
               <a:t>Opciones de Nuevo Proyecto</a:t>
             </a:r>
-            <a:endParaRPr lang="es-CR" dirty="0"/>
           </a:p>
         </p:txBody>
       </p:sp>
@@ -14549,7 +14248,7 @@
               <a:buNone/>
             </a:pPr>
             <a:r>
-              <a:rPr lang="es-CR" dirty="0" smtClean="0"/>
+              <a:rPr lang="es-CR" dirty="0"/>
               <a:t>Aunque en la versión Express de Visual Studio existen varios tipos de proyecto, en este curso nos vamos a centrar en:</a:t>
             </a:r>
           </a:p>
@@ -14557,7 +14256,7 @@
             <a:pPr marL="0" indent="0">
               <a:buNone/>
             </a:pPr>
-            <a:endParaRPr lang="es-CR" dirty="0" smtClean="0"/>
+            <a:endParaRPr lang="es-CR" dirty="0"/>
           </a:p>
           <a:p>
             <a:pPr>
@@ -14565,15 +14264,15 @@
               <a:buChar char="•"/>
             </a:pPr>
             <a:r>
-              <a:rPr lang="es-CR" dirty="0" smtClean="0"/>
+              <a:rPr lang="es-CR" dirty="0"/>
               <a:t>Aplicación de Windows </a:t>
             </a:r>
             <a:r>
-              <a:rPr lang="es-CR" dirty="0" err="1" smtClean="0"/>
+              <a:rPr lang="es-CR" dirty="0" err="1"/>
               <a:t>Forms</a:t>
             </a:r>
             <a:r>
-              <a:rPr lang="es-CR" dirty="0" smtClean="0"/>
+              <a:rPr lang="es-CR" dirty="0"/>
               <a:t>.</a:t>
             </a:r>
           </a:p>
@@ -14583,7 +14282,7 @@
               <a:buChar char="•"/>
             </a:pPr>
             <a:r>
-              <a:rPr lang="es-CR" dirty="0" smtClean="0"/>
+              <a:rPr lang="es-CR" dirty="0"/>
               <a:t>Aplicación de Consola.</a:t>
             </a:r>
           </a:p>
@@ -14602,13 +14301,6 @@
   <p:clrMapOvr>
     <a:masterClrMapping/>
   </p:clrMapOvr>
-  <p:timing>
-    <p:tnLst>
-      <p:par>
-        <p:cTn id="1" dur="indefinite" restart="never" nodeType="tmRoot"/>
-      </p:par>
-    </p:tnLst>
-  </p:timing>
 </p:sld>
 </file>
 

</xml_diff>